<commit_message>
Added NY, Ontario and location permissions
</commit_message>
<xml_diff>
--- a/doc/images/trippr.pptx
+++ b/doc/images/trippr.pptx
@@ -259,7 +259,7 @@
           <a:p>
             <a:fld id="{02C742EB-269B-4B82-BA8B-723E1BC19886}" type="datetimeFigureOut">
               <a:rPr lang="en-US" smtClean="0"/>
-              <a:t>2/26/2023</a:t>
+              <a:t>4/21/2023</a:t>
             </a:fld>
             <a:endParaRPr lang="en-US"/>
           </a:p>
@@ -457,7 +457,7 @@
           <a:p>
             <a:fld id="{02C742EB-269B-4B82-BA8B-723E1BC19886}" type="datetimeFigureOut">
               <a:rPr lang="en-US" smtClean="0"/>
-              <a:t>2/26/2023</a:t>
+              <a:t>4/21/2023</a:t>
             </a:fld>
             <a:endParaRPr lang="en-US"/>
           </a:p>
@@ -665,7 +665,7 @@
           <a:p>
             <a:fld id="{02C742EB-269B-4B82-BA8B-723E1BC19886}" type="datetimeFigureOut">
               <a:rPr lang="en-US" smtClean="0"/>
-              <a:t>2/26/2023</a:t>
+              <a:t>4/21/2023</a:t>
             </a:fld>
             <a:endParaRPr lang="en-US"/>
           </a:p>
@@ -863,7 +863,7 @@
           <a:p>
             <a:fld id="{02C742EB-269B-4B82-BA8B-723E1BC19886}" type="datetimeFigureOut">
               <a:rPr lang="en-US" smtClean="0"/>
-              <a:t>2/26/2023</a:t>
+              <a:t>4/21/2023</a:t>
             </a:fld>
             <a:endParaRPr lang="en-US"/>
           </a:p>
@@ -1138,7 +1138,7 @@
           <a:p>
             <a:fld id="{02C742EB-269B-4B82-BA8B-723E1BC19886}" type="datetimeFigureOut">
               <a:rPr lang="en-US" smtClean="0"/>
-              <a:t>2/26/2023</a:t>
+              <a:t>4/21/2023</a:t>
             </a:fld>
             <a:endParaRPr lang="en-US"/>
           </a:p>
@@ -1403,7 +1403,7 @@
           <a:p>
             <a:fld id="{02C742EB-269B-4B82-BA8B-723E1BC19886}" type="datetimeFigureOut">
               <a:rPr lang="en-US" smtClean="0"/>
-              <a:t>2/26/2023</a:t>
+              <a:t>4/21/2023</a:t>
             </a:fld>
             <a:endParaRPr lang="en-US"/>
           </a:p>
@@ -1815,7 +1815,7 @@
           <a:p>
             <a:fld id="{02C742EB-269B-4B82-BA8B-723E1BC19886}" type="datetimeFigureOut">
               <a:rPr lang="en-US" smtClean="0"/>
-              <a:t>2/26/2023</a:t>
+              <a:t>4/21/2023</a:t>
             </a:fld>
             <a:endParaRPr lang="en-US"/>
           </a:p>
@@ -1956,7 +1956,7 @@
           <a:p>
             <a:fld id="{02C742EB-269B-4B82-BA8B-723E1BC19886}" type="datetimeFigureOut">
               <a:rPr lang="en-US" smtClean="0"/>
-              <a:t>2/26/2023</a:t>
+              <a:t>4/21/2023</a:t>
             </a:fld>
             <a:endParaRPr lang="en-US"/>
           </a:p>
@@ -2069,7 +2069,7 @@
           <a:p>
             <a:fld id="{02C742EB-269B-4B82-BA8B-723E1BC19886}" type="datetimeFigureOut">
               <a:rPr lang="en-US" smtClean="0"/>
-              <a:t>2/26/2023</a:t>
+              <a:t>4/21/2023</a:t>
             </a:fld>
             <a:endParaRPr lang="en-US"/>
           </a:p>
@@ -2380,7 +2380,7 @@
           <a:p>
             <a:fld id="{02C742EB-269B-4B82-BA8B-723E1BC19886}" type="datetimeFigureOut">
               <a:rPr lang="en-US" smtClean="0"/>
-              <a:t>2/26/2023</a:t>
+              <a:t>4/21/2023</a:t>
             </a:fld>
             <a:endParaRPr lang="en-US"/>
           </a:p>
@@ -2668,7 +2668,7 @@
           <a:p>
             <a:fld id="{02C742EB-269B-4B82-BA8B-723E1BC19886}" type="datetimeFigureOut">
               <a:rPr lang="en-US" smtClean="0"/>
-              <a:t>2/26/2023</a:t>
+              <a:t>4/21/2023</a:t>
             </a:fld>
             <a:endParaRPr lang="en-US"/>
           </a:p>
@@ -2909,7 +2909,7 @@
           <a:p>
             <a:fld id="{02C742EB-269B-4B82-BA8B-723E1BC19886}" type="datetimeFigureOut">
               <a:rPr lang="en-US" smtClean="0"/>
-              <a:t>2/26/2023</a:t>
+              <a:t>4/21/2023</a:t>
             </a:fld>
             <a:endParaRPr lang="en-US"/>
           </a:p>
@@ -3534,7 +3534,7 @@
         <p:spPr>
           <a:xfrm>
             <a:off x="7329762" y="3439567"/>
-            <a:ext cx="1321196" cy="769441"/>
+            <a:ext cx="2443298" cy="769441"/>
           </a:xfrm>
           <a:prstGeom prst="rect">
             <a:avLst/>
@@ -3548,17 +3548,26 @@
           <a:lstStyle/>
           <a:p>
             <a:r>
-              <a:rPr lang="en-US" sz="4400" b="1" dirty="0">
+              <a:rPr lang="en-US" sz="4400" b="1" dirty="0" err="1">
                 <a:solidFill>
                   <a:schemeClr val="accent4">
                     <a:lumMod val="60000"/>
                     <a:lumOff val="40000"/>
                   </a:schemeClr>
                 </a:solidFill>
-                <a:latin typeface="Abadi" panose="020B0604020104020204" pitchFamily="34" charset="0"/>
+                <a:latin typeface="Avenir Next LT Pro Demi" panose="020B0604020202020204" pitchFamily="34" charset="0"/>
               </a:rPr>
-              <a:t>rippr</a:t>
-            </a:r>
+              <a:t>ripperist</a:t>
+            </a:r>
+            <a:endParaRPr lang="en-US" sz="4400" b="1" dirty="0">
+              <a:solidFill>
+                <a:schemeClr val="accent4">
+                  <a:lumMod val="60000"/>
+                  <a:lumOff val="40000"/>
+                </a:schemeClr>
+              </a:solidFill>
+              <a:latin typeface="Avenir Next LT Pro Demi" panose="020B0604020202020204" pitchFamily="34" charset="0"/>
+            </a:endParaRPr>
           </a:p>
         </p:txBody>
       </p:sp>
@@ -4439,8 +4448,316 @@
         </p:blipFill>
         <p:spPr>
           <a:xfrm>
-            <a:off x="6029787" y="1653813"/>
+            <a:off x="2642909" y="2087374"/>
             <a:ext cx="920576" cy="883997"/>
+          </a:xfrm>
+          <a:prstGeom prst="rect">
+            <a:avLst/>
+          </a:prstGeom>
+        </p:spPr>
+      </p:pic>
+      <p:pic>
+        <p:nvPicPr>
+          <p:cNvPr id="9" name="Graphic 8" descr="Marker with solid fill">
+            <a:extLst>
+              <a:ext uri="{FF2B5EF4-FFF2-40B4-BE49-F238E27FC236}">
+                <a16:creationId xmlns:a16="http://schemas.microsoft.com/office/drawing/2014/main" id="{0EEDE1FF-9E56-ADEE-BA70-7FC5238E8353}"/>
+              </a:ext>
+            </a:extLst>
+          </p:cNvPr>
+          <p:cNvPicPr>
+            <a:picLocks noChangeAspect="1"/>
+          </p:cNvPicPr>
+          <p:nvPr/>
+        </p:nvPicPr>
+        <p:blipFill>
+          <a:blip r:embed="rId4">
+            <a:extLst>
+              <a:ext uri="{28A0092B-C50C-407E-A947-70E740481C1C}">
+                <a14:useLocalDpi xmlns:a14="http://schemas.microsoft.com/office/drawing/2010/main" val="0"/>
+              </a:ext>
+              <a:ext uri="{96DAC541-7B7A-43D3-8B79-37D633B846F1}">
+                <asvg:svgBlip xmlns:asvg="http://schemas.microsoft.com/office/drawing/2016/SVG/main" r:embed="rId5"/>
+              </a:ext>
+            </a:extLst>
+          </a:blip>
+          <a:stretch>
+            <a:fillRect/>
+          </a:stretch>
+        </p:blipFill>
+        <p:spPr>
+          <a:xfrm rot="6882074">
+            <a:off x="6707240" y="606390"/>
+            <a:ext cx="914400" cy="914400"/>
+          </a:xfrm>
+          <a:prstGeom prst="rect">
+            <a:avLst/>
+          </a:prstGeom>
+        </p:spPr>
+      </p:pic>
+      <p:sp>
+        <p:nvSpPr>
+          <p:cNvPr id="10" name="TextBox 9">
+            <a:extLst>
+              <a:ext uri="{FF2B5EF4-FFF2-40B4-BE49-F238E27FC236}">
+                <a16:creationId xmlns:a16="http://schemas.microsoft.com/office/drawing/2014/main" id="{F5E69153-6B45-08E2-2A84-1529FA7EA2FB}"/>
+              </a:ext>
+            </a:extLst>
+          </p:cNvPr>
+          <p:cNvSpPr txBox="1"/>
+          <p:nvPr/>
+        </p:nvSpPr>
+        <p:spPr>
+          <a:xfrm>
+            <a:off x="7329762" y="998007"/>
+            <a:ext cx="2414444" cy="769441"/>
+          </a:xfrm>
+          <a:prstGeom prst="rect">
+            <a:avLst/>
+          </a:prstGeom>
+          <a:noFill/>
+        </p:spPr>
+        <p:txBody>
+          <a:bodyPr wrap="none" rtlCol="0">
+            <a:spAutoFit/>
+          </a:bodyPr>
+          <a:lstStyle/>
+          <a:p>
+            <a:r>
+              <a:rPr lang="en-US" sz="4400" b="1" dirty="0" err="1">
+                <a:solidFill>
+                  <a:schemeClr val="accent4">
+                    <a:lumMod val="60000"/>
+                    <a:lumOff val="40000"/>
+                  </a:schemeClr>
+                </a:solidFill>
+                <a:latin typeface="Aharoni" panose="02010803020104030203" pitchFamily="2" charset="-79"/>
+                <a:cs typeface="Aharoni" panose="02010803020104030203" pitchFamily="2" charset="-79"/>
+              </a:rPr>
+              <a:t>ripperist</a:t>
+            </a:r>
+            <a:endParaRPr lang="en-US" sz="4400" b="1" dirty="0">
+              <a:solidFill>
+                <a:schemeClr val="accent4">
+                  <a:lumMod val="60000"/>
+                  <a:lumOff val="40000"/>
+                </a:schemeClr>
+              </a:solidFill>
+              <a:latin typeface="Aharoni" panose="02010803020104030203" pitchFamily="2" charset="-79"/>
+              <a:cs typeface="Aharoni" panose="02010803020104030203" pitchFamily="2" charset="-79"/>
+            </a:endParaRPr>
+          </a:p>
+        </p:txBody>
+      </p:sp>
+      <p:pic>
+        <p:nvPicPr>
+          <p:cNvPr id="11" name="Graphic 10" descr="Marker with solid fill">
+            <a:extLst>
+              <a:ext uri="{FF2B5EF4-FFF2-40B4-BE49-F238E27FC236}">
+                <a16:creationId xmlns:a16="http://schemas.microsoft.com/office/drawing/2014/main" id="{5B5918BD-639F-252E-6236-46CDD03D34AF}"/>
+              </a:ext>
+            </a:extLst>
+          </p:cNvPr>
+          <p:cNvPicPr>
+            <a:picLocks noChangeAspect="1"/>
+          </p:cNvPicPr>
+          <p:nvPr/>
+        </p:nvPicPr>
+        <p:blipFill>
+          <a:blip r:embed="rId6">
+            <a:extLst>
+              <a:ext uri="{28A0092B-C50C-407E-A947-70E740481C1C}">
+                <a14:useLocalDpi xmlns:a14="http://schemas.microsoft.com/office/drawing/2010/main" val="0"/>
+              </a:ext>
+              <a:ext uri="{96DAC541-7B7A-43D3-8B79-37D633B846F1}">
+                <asvg:svgBlip xmlns:asvg="http://schemas.microsoft.com/office/drawing/2016/SVG/main" r:embed="rId7"/>
+              </a:ext>
+            </a:extLst>
+          </a:blip>
+          <a:stretch>
+            <a:fillRect/>
+          </a:stretch>
+        </p:blipFill>
+        <p:spPr>
+          <a:xfrm>
+            <a:off x="6817497" y="779571"/>
+            <a:ext cx="914400" cy="914400"/>
+          </a:xfrm>
+          <a:prstGeom prst="rect">
+            <a:avLst/>
+          </a:prstGeom>
+        </p:spPr>
+      </p:pic>
+      <p:pic>
+        <p:nvPicPr>
+          <p:cNvPr id="12" name="Graphic 11" descr="Marker with solid fill">
+            <a:extLst>
+              <a:ext uri="{FF2B5EF4-FFF2-40B4-BE49-F238E27FC236}">
+                <a16:creationId xmlns:a16="http://schemas.microsoft.com/office/drawing/2014/main" id="{1F546D7E-C1BA-46DC-3EF6-AB999BC6E8D7}"/>
+              </a:ext>
+            </a:extLst>
+          </p:cNvPr>
+          <p:cNvPicPr>
+            <a:picLocks noChangeAspect="1"/>
+          </p:cNvPicPr>
+          <p:nvPr/>
+        </p:nvPicPr>
+        <p:blipFill>
+          <a:blip r:embed="rId8">
+            <a:extLst>
+              <a:ext uri="{28A0092B-C50C-407E-A947-70E740481C1C}">
+                <a14:useLocalDpi xmlns:a14="http://schemas.microsoft.com/office/drawing/2010/main" val="0"/>
+              </a:ext>
+              <a:ext uri="{96DAC541-7B7A-43D3-8B79-37D633B846F1}">
+                <asvg:svgBlip xmlns:asvg="http://schemas.microsoft.com/office/drawing/2016/SVG/main" r:embed="rId9"/>
+              </a:ext>
+            </a:extLst>
+          </a:blip>
+          <a:stretch>
+            <a:fillRect/>
+          </a:stretch>
+        </p:blipFill>
+        <p:spPr>
+          <a:xfrm rot="14707688">
+            <a:off x="6932455" y="605724"/>
+            <a:ext cx="914400" cy="914400"/>
+          </a:xfrm>
+          <a:prstGeom prst="rect">
+            <a:avLst/>
+          </a:prstGeom>
+        </p:spPr>
+      </p:pic>
+      <p:pic>
+        <p:nvPicPr>
+          <p:cNvPr id="15" name="Picture 14">
+            <a:extLst>
+              <a:ext uri="{FF2B5EF4-FFF2-40B4-BE49-F238E27FC236}">
+                <a16:creationId xmlns:a16="http://schemas.microsoft.com/office/drawing/2014/main" id="{3C3B72D1-BD61-101D-8E95-81851F048476}"/>
+              </a:ext>
+            </a:extLst>
+          </p:cNvPr>
+          <p:cNvPicPr>
+            <a:picLocks noChangeAspect="1"/>
+          </p:cNvPicPr>
+          <p:nvPr/>
+        </p:nvPicPr>
+        <p:blipFill rotWithShape="1">
+          <a:blip r:embed="rId12"/>
+          <a:srcRect l="8443" t="-42468" r="8443" b="-42468"/>
+          <a:stretch/>
+        </p:blipFill>
+        <p:spPr>
+          <a:xfrm>
+            <a:off x="8158400" y="998007"/>
+            <a:ext cx="2847672" cy="2965226"/>
+          </a:xfrm>
+          <a:prstGeom prst="rect">
+            <a:avLst/>
+          </a:prstGeom>
+        </p:spPr>
+      </p:pic>
+      <p:pic>
+        <p:nvPicPr>
+          <p:cNvPr id="13" name="Picture 12" descr="A picture containing graphics, font, logo, graphic design&#10;&#10;Description automatically generated">
+            <a:extLst>
+              <a:ext uri="{FF2B5EF4-FFF2-40B4-BE49-F238E27FC236}">
+                <a16:creationId xmlns:a16="http://schemas.microsoft.com/office/drawing/2014/main" id="{6B67D0C8-93C9-2482-36CA-180CAA327C9D}"/>
+              </a:ext>
+            </a:extLst>
+          </p:cNvPr>
+          <p:cNvPicPr>
+            <a:picLocks noChangeAspect="1"/>
+          </p:cNvPicPr>
+          <p:nvPr/>
+        </p:nvPicPr>
+        <p:blipFill>
+          <a:blip r:embed="rId13">
+            <a:extLst>
+              <a:ext uri="{28A0092B-C50C-407E-A947-70E740481C1C}">
+                <a14:useLocalDpi xmlns:a14="http://schemas.microsoft.com/office/drawing/2010/main" val="0"/>
+              </a:ext>
+            </a:extLst>
+          </a:blip>
+          <a:stretch>
+            <a:fillRect/>
+          </a:stretch>
+        </p:blipFill>
+        <p:spPr>
+          <a:xfrm>
+            <a:off x="362663" y="1000826"/>
+            <a:ext cx="4877481" cy="4877481"/>
+          </a:xfrm>
+          <a:prstGeom prst="rect">
+            <a:avLst/>
+          </a:prstGeom>
+        </p:spPr>
+      </p:pic>
+      <p:pic>
+        <p:nvPicPr>
+          <p:cNvPr id="18" name="Picture 17" descr="A yellow and black logo&#10;&#10;Description automatically generated with low confidence">
+            <a:extLst>
+              <a:ext uri="{FF2B5EF4-FFF2-40B4-BE49-F238E27FC236}">
+                <a16:creationId xmlns:a16="http://schemas.microsoft.com/office/drawing/2014/main" id="{A4441118-7C17-DD2E-C61F-B64807F84691}"/>
+              </a:ext>
+            </a:extLst>
+          </p:cNvPr>
+          <p:cNvPicPr>
+            <a:picLocks noChangeAspect="1"/>
+          </p:cNvPicPr>
+          <p:nvPr/>
+        </p:nvPicPr>
+        <p:blipFill>
+          <a:blip r:embed="rId14">
+            <a:extLst>
+              <a:ext uri="{28A0092B-C50C-407E-A947-70E740481C1C}">
+                <a14:useLocalDpi xmlns:a14="http://schemas.microsoft.com/office/drawing/2010/main" val="0"/>
+              </a:ext>
+            </a:extLst>
+          </a:blip>
+          <a:stretch>
+            <a:fillRect/>
+          </a:stretch>
+        </p:blipFill>
+        <p:spPr>
+          <a:xfrm>
+            <a:off x="8739213" y="3703983"/>
+            <a:ext cx="2438740" cy="2438740"/>
+          </a:xfrm>
+          <a:prstGeom prst="rect">
+            <a:avLst/>
+          </a:prstGeom>
+        </p:spPr>
+      </p:pic>
+      <p:pic>
+        <p:nvPicPr>
+          <p:cNvPr id="20" name="Picture 19" descr="A yellow and black logo&#10;&#10;Description automatically generated with low confidence">
+            <a:extLst>
+              <a:ext uri="{FF2B5EF4-FFF2-40B4-BE49-F238E27FC236}">
+                <a16:creationId xmlns:a16="http://schemas.microsoft.com/office/drawing/2014/main" id="{B2204FBC-2FF4-6205-00F5-C95E91D443D5}"/>
+              </a:ext>
+            </a:extLst>
+          </p:cNvPr>
+          <p:cNvPicPr>
+            <a:picLocks noChangeAspect="1"/>
+          </p:cNvPicPr>
+          <p:nvPr/>
+        </p:nvPicPr>
+        <p:blipFill>
+          <a:blip r:embed="rId14">
+            <a:extLst>
+              <a:ext uri="{28A0092B-C50C-407E-A947-70E740481C1C}">
+                <a14:useLocalDpi xmlns:a14="http://schemas.microsoft.com/office/drawing/2010/main" val="0"/>
+              </a:ext>
+            </a:extLst>
+          </a:blip>
+          <a:stretch>
+            <a:fillRect/>
+          </a:stretch>
+        </p:blipFill>
+        <p:spPr>
+          <a:xfrm>
+            <a:off x="192301" y="46615"/>
+            <a:ext cx="2438740" cy="2438740"/>
           </a:xfrm>
           <a:prstGeom prst="rect">
             <a:avLst/>

</xml_diff>